<commit_message>
Upload tesi e presentazione modificate
</commit_message>
<xml_diff>
--- a/Marchetti/Tesi/Presentazione tesi.pptx
+++ b/Marchetti/Tesi/Presentazione tesi.pptx
@@ -16,10 +16,11 @@
     <p:sldId id="271" r:id="rId10"/>
     <p:sldId id="265" r:id="rId11"/>
     <p:sldId id="266" r:id="rId12"/>
-    <p:sldId id="267" r:id="rId13"/>
-    <p:sldId id="268" r:id="rId14"/>
-    <p:sldId id="269" r:id="rId15"/>
-    <p:sldId id="270" r:id="rId16"/>
+    <p:sldId id="272" r:id="rId13"/>
+    <p:sldId id="267" r:id="rId14"/>
+    <p:sldId id="268" r:id="rId15"/>
+    <p:sldId id="269" r:id="rId16"/>
+    <p:sldId id="270" r:id="rId17"/>
   </p:sldIdLst>
   <p:sldSz cx="9144000" cy="6858000" type="screen4x3"/>
   <p:notesSz cx="6858000" cy="9144000"/>
@@ -255,7 +256,7 @@
           <a:p>
             <a:fld id="{7F49D355-16BD-4E45-BD9A-5EA878CF7CBD}" type="datetimeFigureOut">
               <a:rPr lang="it-IT" smtClean="0"/>
-              <a:t>17/10/2016</a:t>
+              <a:t>18/10/2016</a:t>
             </a:fld>
             <a:endParaRPr lang="it-IT"/>
           </a:p>
@@ -568,7 +569,7 @@
           <a:p>
             <a:fld id="{7F49D355-16BD-4E45-BD9A-5EA878CF7CBD}" type="datetimeFigureOut">
               <a:rPr lang="it-IT" smtClean="0"/>
-              <a:t>17/10/2016</a:t>
+              <a:t>18/10/2016</a:t>
             </a:fld>
             <a:endParaRPr lang="it-IT"/>
           </a:p>
@@ -753,7 +754,7 @@
           <a:p>
             <a:fld id="{7F49D355-16BD-4E45-BD9A-5EA878CF7CBD}" type="datetimeFigureOut">
               <a:rPr lang="it-IT" smtClean="0"/>
-              <a:t>17/10/2016</a:t>
+              <a:t>18/10/2016</a:t>
             </a:fld>
             <a:endParaRPr lang="it-IT"/>
           </a:p>
@@ -928,7 +929,7 @@
           <a:p>
             <a:fld id="{7F49D355-16BD-4E45-BD9A-5EA878CF7CBD}" type="datetimeFigureOut">
               <a:rPr lang="it-IT" smtClean="0"/>
-              <a:t>17/10/2016</a:t>
+              <a:t>18/10/2016</a:t>
             </a:fld>
             <a:endParaRPr lang="it-IT"/>
           </a:p>
@@ -1196,7 +1197,7 @@
           <a:p>
             <a:fld id="{7F49D355-16BD-4E45-BD9A-5EA878CF7CBD}" type="datetimeFigureOut">
               <a:rPr lang="it-IT" smtClean="0"/>
-              <a:t>17/10/2016</a:t>
+              <a:t>18/10/2016</a:t>
             </a:fld>
             <a:endParaRPr lang="it-IT"/>
           </a:p>
@@ -1664,7 +1665,7 @@
           <a:p>
             <a:fld id="{7F49D355-16BD-4E45-BD9A-5EA878CF7CBD}" type="datetimeFigureOut">
               <a:rPr lang="it-IT" smtClean="0"/>
-              <a:t>17/10/2016</a:t>
+              <a:t>18/10/2016</a:t>
             </a:fld>
             <a:endParaRPr lang="it-IT"/>
           </a:p>
@@ -2153,7 +2154,7 @@
           <a:p>
             <a:fld id="{7F49D355-16BD-4E45-BD9A-5EA878CF7CBD}" type="datetimeFigureOut">
               <a:rPr lang="it-IT" smtClean="0"/>
-              <a:t>17/10/2016</a:t>
+              <a:t>18/10/2016</a:t>
             </a:fld>
             <a:endParaRPr lang="it-IT"/>
           </a:p>
@@ -2279,7 +2280,7 @@
           <a:p>
             <a:fld id="{7F49D355-16BD-4E45-BD9A-5EA878CF7CBD}" type="datetimeFigureOut">
               <a:rPr lang="it-IT" smtClean="0"/>
-              <a:t>17/10/2016</a:t>
+              <a:t>18/10/2016</a:t>
             </a:fld>
             <a:endParaRPr lang="it-IT"/>
           </a:p>
@@ -2423,7 +2424,7 @@
           <a:p>
             <a:fld id="{7F49D355-16BD-4E45-BD9A-5EA878CF7CBD}" type="datetimeFigureOut">
               <a:rPr lang="it-IT" smtClean="0"/>
-              <a:t>17/10/2016</a:t>
+              <a:t>18/10/2016</a:t>
             </a:fld>
             <a:endParaRPr lang="it-IT"/>
           </a:p>
@@ -2745,7 +2746,7 @@
           <a:p>
             <a:fld id="{7F49D355-16BD-4E45-BD9A-5EA878CF7CBD}" type="datetimeFigureOut">
               <a:rPr lang="it-IT" smtClean="0"/>
-              <a:t>17/10/2016</a:t>
+              <a:t>18/10/2016</a:t>
             </a:fld>
             <a:endParaRPr lang="it-IT"/>
           </a:p>
@@ -2879,7 +2880,7 @@
           <a:p>
             <a:fld id="{7F49D355-16BD-4E45-BD9A-5EA878CF7CBD}" type="datetimeFigureOut">
               <a:rPr lang="it-IT" smtClean="0"/>
-              <a:t>17/10/2016</a:t>
+              <a:t>18/10/2016</a:t>
             </a:fld>
             <a:endParaRPr lang="it-IT"/>
           </a:p>
@@ -3660,7 +3661,7 @@
           <a:p>
             <a:fld id="{7F49D355-16BD-4E45-BD9A-5EA878CF7CBD}" type="datetimeFigureOut">
               <a:rPr lang="it-IT" smtClean="0"/>
-              <a:t>17/10/2016</a:t>
+              <a:t>18/10/2016</a:t>
             </a:fld>
             <a:endParaRPr lang="it-IT"/>
           </a:p>
@@ -5440,6 +5441,1352 @@
             <a:pPr algn="ctr"/>
             <a:r>
               <a:rPr lang="it-IT" sz="3200" dirty="0" smtClean="0"/>
+              <a:t>Risorse software utilizzate</a:t>
+            </a:r>
+            <a:endParaRPr lang="it-IT" sz="3200" dirty="0"/>
+          </a:p>
+        </p:txBody>
+      </p:sp>
+      <p:sp>
+        <p:nvSpPr>
+          <p:cNvPr id="3" name="Sottotitolo 2"/>
+          <p:cNvSpPr>
+            <a:spLocks noGrp="1"/>
+          </p:cNvSpPr>
+          <p:nvPr>
+            <p:ph type="subTitle" idx="1"/>
+          </p:nvPr>
+        </p:nvSpPr>
+        <p:spPr>
+          <a:xfrm>
+            <a:off x="3491880" y="1883685"/>
+            <a:ext cx="5493104" cy="969251"/>
+          </a:xfrm>
+        </p:spPr>
+        <p:txBody>
+          <a:bodyPr>
+            <a:normAutofit/>
+          </a:bodyPr>
+          <a:lstStyle/>
+          <a:p>
+            <a:r>
+              <a:rPr lang="it-IT" sz="2400" dirty="0" smtClean="0"/>
+              <a:t>Java per la definizione di libreria, </a:t>
+            </a:r>
+            <a:r>
+              <a:rPr lang="it-IT" sz="2400" dirty="0" err="1" smtClean="0"/>
+              <a:t>Parser</a:t>
+            </a:r>
+            <a:r>
+              <a:rPr lang="it-IT" sz="2400" dirty="0" smtClean="0"/>
+              <a:t> e test</a:t>
+            </a:r>
+            <a:endParaRPr lang="it-IT" sz="2400" dirty="0" smtClean="0"/>
+          </a:p>
+        </p:txBody>
+      </p:sp>
+      <p:pic>
+        <p:nvPicPr>
+          <p:cNvPr id="5" name="Immagine 4"/>
+          <p:cNvPicPr>
+            <a:picLocks noChangeAspect="1"/>
+          </p:cNvPicPr>
+          <p:nvPr/>
+        </p:nvPicPr>
+        <p:blipFill>
+          <a:blip r:embed="rId2">
+            <a:extLst>
+              <a:ext uri="{28A0092B-C50C-407E-A947-70E740481C1C}">
+                <a14:useLocalDpi xmlns:a14="http://schemas.microsoft.com/office/drawing/2010/main" val="0"/>
+              </a:ext>
+            </a:extLst>
+          </a:blip>
+          <a:stretch>
+            <a:fillRect/>
+          </a:stretch>
+        </p:blipFill>
+        <p:spPr>
+          <a:xfrm>
+            <a:off x="1459896" y="5511722"/>
+            <a:ext cx="1490489" cy="925672"/>
+          </a:xfrm>
+          <a:prstGeom prst="rect">
+            <a:avLst/>
+          </a:prstGeom>
+        </p:spPr>
+      </p:pic>
+      <p:pic>
+        <p:nvPicPr>
+          <p:cNvPr id="7" name="Immagine 6"/>
+          <p:cNvPicPr>
+            <a:picLocks noChangeAspect="1"/>
+          </p:cNvPicPr>
+          <p:nvPr/>
+        </p:nvPicPr>
+        <p:blipFill>
+          <a:blip r:embed="rId3">
+            <a:extLst>
+              <a:ext uri="{28A0092B-C50C-407E-A947-70E740481C1C}">
+                <a14:useLocalDpi xmlns:a14="http://schemas.microsoft.com/office/drawing/2010/main" val="0"/>
+              </a:ext>
+            </a:extLst>
+          </a:blip>
+          <a:stretch>
+            <a:fillRect/>
+          </a:stretch>
+        </p:blipFill>
+        <p:spPr>
+          <a:xfrm>
+            <a:off x="1712222" y="1772816"/>
+            <a:ext cx="985838" cy="985838"/>
+          </a:xfrm>
+          <a:prstGeom prst="rect">
+            <a:avLst/>
+          </a:prstGeom>
+        </p:spPr>
+      </p:pic>
+      <p:pic>
+        <p:nvPicPr>
+          <p:cNvPr id="9" name="Immagine 8"/>
+          <p:cNvPicPr>
+            <a:picLocks noChangeAspect="1"/>
+          </p:cNvPicPr>
+          <p:nvPr/>
+        </p:nvPicPr>
+        <p:blipFill>
+          <a:blip r:embed="rId4">
+            <a:extLst>
+              <a:ext uri="{28A0092B-C50C-407E-A947-70E740481C1C}">
+                <a14:useLocalDpi xmlns:a14="http://schemas.microsoft.com/office/drawing/2010/main" val="0"/>
+              </a:ext>
+            </a:extLst>
+          </a:blip>
+          <a:stretch>
+            <a:fillRect/>
+          </a:stretch>
+        </p:blipFill>
+        <p:spPr>
+          <a:xfrm>
+            <a:off x="1319515" y="3068960"/>
+            <a:ext cx="1771252" cy="982721"/>
+          </a:xfrm>
+          <a:prstGeom prst="rect">
+            <a:avLst/>
+          </a:prstGeom>
+        </p:spPr>
+      </p:pic>
+      <p:pic>
+        <p:nvPicPr>
+          <p:cNvPr id="11" name="Immagine 10"/>
+          <p:cNvPicPr>
+            <a:picLocks noChangeAspect="1"/>
+          </p:cNvPicPr>
+          <p:nvPr/>
+        </p:nvPicPr>
+        <p:blipFill>
+          <a:blip r:embed="rId5">
+            <a:extLst>
+              <a:ext uri="{28A0092B-C50C-407E-A947-70E740481C1C}">
+                <a14:useLocalDpi xmlns:a14="http://schemas.microsoft.com/office/drawing/2010/main" val="0"/>
+              </a:ext>
+            </a:extLst>
+          </a:blip>
+          <a:stretch>
+            <a:fillRect/>
+          </a:stretch>
+        </p:blipFill>
+        <p:spPr>
+          <a:xfrm>
+            <a:off x="1412555" y="4533294"/>
+            <a:ext cx="1585172" cy="672246"/>
+          </a:xfrm>
+          <a:prstGeom prst="rect">
+            <a:avLst/>
+          </a:prstGeom>
+        </p:spPr>
+      </p:pic>
+      <p:sp>
+        <p:nvSpPr>
+          <p:cNvPr id="12" name="Sottotitolo 2"/>
+          <p:cNvSpPr txBox="1">
+            <a:spLocks/>
+          </p:cNvSpPr>
+          <p:nvPr/>
+        </p:nvSpPr>
+        <p:spPr>
+          <a:xfrm>
+            <a:off x="3471384" y="3107821"/>
+            <a:ext cx="5493104" cy="969251"/>
+          </a:xfrm>
+          <a:prstGeom prst="rect">
+            <a:avLst/>
+          </a:prstGeom>
+        </p:spPr>
+        <p:txBody>
+          <a:bodyPr tIns="0">
+            <a:normAutofit/>
+          </a:bodyPr>
+          <a:lstStyle>
+            <a:lvl1pPr marL="27432" indent="0" algn="l" rtl="0" eaLnBrk="1" latinLnBrk="0" hangingPunct="1">
+              <a:lnSpc>
+                <a:spcPct val="100000"/>
+              </a:lnSpc>
+              <a:spcBef>
+                <a:spcPts val="600"/>
+              </a:spcBef>
+              <a:buClr>
+                <a:schemeClr val="accent1"/>
+              </a:buClr>
+              <a:buSzPct val="80000"/>
+              <a:buFont typeface="Wingdings 2"/>
+              <a:buNone/>
+              <a:defRPr kumimoji="0" sz="2600" kern="1200">
+                <a:solidFill>
+                  <a:schemeClr val="tx2">
+                    <a:shade val="30000"/>
+                    <a:satMod val="150000"/>
+                  </a:schemeClr>
+                </a:solidFill>
+                <a:latin typeface="+mn-lt"/>
+                <a:ea typeface="+mn-ea"/>
+                <a:cs typeface="+mn-cs"/>
+              </a:defRPr>
+            </a:lvl1pPr>
+            <a:lvl2pPr marL="457200" indent="0" algn="ctr" rtl="0" eaLnBrk="1" latinLnBrk="0" hangingPunct="1">
+              <a:lnSpc>
+                <a:spcPct val="100000"/>
+              </a:lnSpc>
+              <a:spcBef>
+                <a:spcPts val="550"/>
+              </a:spcBef>
+              <a:buClr>
+                <a:schemeClr val="accent1"/>
+              </a:buClr>
+              <a:buFont typeface="Verdana"/>
+              <a:buNone/>
+              <a:defRPr kumimoji="0" sz="2800" kern="1200">
+                <a:solidFill>
+                  <a:schemeClr val="tx1"/>
+                </a:solidFill>
+                <a:latin typeface="+mn-lt"/>
+                <a:ea typeface="+mn-ea"/>
+                <a:cs typeface="+mn-cs"/>
+              </a:defRPr>
+            </a:lvl2pPr>
+            <a:lvl3pPr marL="914400" indent="0" algn="ctr" rtl="0" eaLnBrk="1" latinLnBrk="0" hangingPunct="1">
+              <a:lnSpc>
+                <a:spcPct val="100000"/>
+              </a:lnSpc>
+              <a:spcBef>
+                <a:spcPct val="20000"/>
+              </a:spcBef>
+              <a:buClr>
+                <a:schemeClr val="accent2"/>
+              </a:buClr>
+              <a:buFont typeface="Wingdings 2"/>
+              <a:buNone/>
+              <a:defRPr kumimoji="0" sz="2400" kern="1200">
+                <a:solidFill>
+                  <a:schemeClr val="tx1"/>
+                </a:solidFill>
+                <a:latin typeface="+mn-lt"/>
+                <a:ea typeface="+mn-ea"/>
+                <a:cs typeface="+mn-cs"/>
+              </a:defRPr>
+            </a:lvl3pPr>
+            <a:lvl4pPr marL="1371600" indent="0" algn="ctr" rtl="0" eaLnBrk="1" latinLnBrk="0" hangingPunct="1">
+              <a:lnSpc>
+                <a:spcPct val="100000"/>
+              </a:lnSpc>
+              <a:spcBef>
+                <a:spcPct val="20000"/>
+              </a:spcBef>
+              <a:buClr>
+                <a:schemeClr val="accent3"/>
+              </a:buClr>
+              <a:buFont typeface="Wingdings 2"/>
+              <a:buNone/>
+              <a:defRPr kumimoji="0" sz="2000" kern="1200">
+                <a:solidFill>
+                  <a:schemeClr val="tx1"/>
+                </a:solidFill>
+                <a:latin typeface="+mn-lt"/>
+                <a:ea typeface="+mn-ea"/>
+                <a:cs typeface="+mn-cs"/>
+              </a:defRPr>
+            </a:lvl4pPr>
+            <a:lvl5pPr marL="1828800" indent="0" algn="ctr" rtl="0" eaLnBrk="1" latinLnBrk="0" hangingPunct="1">
+              <a:lnSpc>
+                <a:spcPct val="100000"/>
+              </a:lnSpc>
+              <a:spcBef>
+                <a:spcPct val="20000"/>
+              </a:spcBef>
+              <a:buClr>
+                <a:schemeClr val="accent4"/>
+              </a:buClr>
+              <a:buFont typeface="Wingdings 2"/>
+              <a:buNone/>
+              <a:defRPr kumimoji="0" sz="2000" kern="1200">
+                <a:solidFill>
+                  <a:schemeClr val="tx1"/>
+                </a:solidFill>
+                <a:latin typeface="+mn-lt"/>
+                <a:ea typeface="+mn-ea"/>
+                <a:cs typeface="+mn-cs"/>
+              </a:defRPr>
+            </a:lvl5pPr>
+            <a:lvl6pPr marL="2286000" indent="0" algn="ctr" rtl="0" eaLnBrk="1" latinLnBrk="0" hangingPunct="1">
+              <a:lnSpc>
+                <a:spcPct val="100000"/>
+              </a:lnSpc>
+              <a:spcBef>
+                <a:spcPct val="20000"/>
+              </a:spcBef>
+              <a:buClr>
+                <a:schemeClr val="accent5"/>
+              </a:buClr>
+              <a:buFont typeface="Wingdings 2"/>
+              <a:buNone/>
+              <a:defRPr kumimoji="0" sz="2000" kern="1200">
+                <a:solidFill>
+                  <a:schemeClr val="tx1"/>
+                </a:solidFill>
+                <a:latin typeface="+mn-lt"/>
+                <a:ea typeface="+mn-ea"/>
+                <a:cs typeface="+mn-cs"/>
+              </a:defRPr>
+            </a:lvl6pPr>
+            <a:lvl7pPr marL="2743200" indent="0" algn="ctr" rtl="0" eaLnBrk="1" latinLnBrk="0" hangingPunct="1">
+              <a:lnSpc>
+                <a:spcPct val="100000"/>
+              </a:lnSpc>
+              <a:spcBef>
+                <a:spcPct val="20000"/>
+              </a:spcBef>
+              <a:buClr>
+                <a:schemeClr val="accent6"/>
+              </a:buClr>
+              <a:buFont typeface="Wingdings 2"/>
+              <a:buNone/>
+              <a:defRPr kumimoji="0" sz="2000" kern="1200">
+                <a:solidFill>
+                  <a:schemeClr val="tx1"/>
+                </a:solidFill>
+                <a:latin typeface="+mn-lt"/>
+                <a:ea typeface="+mn-ea"/>
+                <a:cs typeface="+mn-cs"/>
+              </a:defRPr>
+            </a:lvl7pPr>
+            <a:lvl8pPr marL="3200400" indent="0" algn="ctr" rtl="0" eaLnBrk="1" latinLnBrk="0" hangingPunct="1">
+              <a:lnSpc>
+                <a:spcPct val="100000"/>
+              </a:lnSpc>
+              <a:spcBef>
+                <a:spcPct val="20000"/>
+              </a:spcBef>
+              <a:buClr>
+                <a:schemeClr val="accent6"/>
+              </a:buClr>
+              <a:buFont typeface="Wingdings 2"/>
+              <a:buNone/>
+              <a:defRPr kumimoji="0" sz="2000" kern="1200">
+                <a:solidFill>
+                  <a:schemeClr val="tx1"/>
+                </a:solidFill>
+                <a:latin typeface="+mn-lt"/>
+                <a:ea typeface="+mn-ea"/>
+                <a:cs typeface="+mn-cs"/>
+              </a:defRPr>
+            </a:lvl8pPr>
+            <a:lvl9pPr marL="3657600" indent="0" algn="ctr" rtl="0" eaLnBrk="1" latinLnBrk="0" hangingPunct="1">
+              <a:lnSpc>
+                <a:spcPct val="100000"/>
+              </a:lnSpc>
+              <a:spcBef>
+                <a:spcPct val="20000"/>
+              </a:spcBef>
+              <a:buClr>
+                <a:schemeClr val="accent6"/>
+              </a:buClr>
+              <a:buFont typeface="Wingdings 2"/>
+              <a:buNone/>
+              <a:defRPr kumimoji="0" sz="2000" kern="1200">
+                <a:solidFill>
+                  <a:schemeClr val="tx1"/>
+                </a:solidFill>
+                <a:latin typeface="+mn-lt"/>
+                <a:ea typeface="+mn-ea"/>
+                <a:cs typeface="+mn-cs"/>
+              </a:defRPr>
+            </a:lvl9pPr>
+            <a:extLst/>
+          </a:lstStyle>
+          <a:p>
+            <a:r>
+              <a:rPr lang="it-IT" sz="2400" dirty="0" err="1" smtClean="0"/>
+              <a:t>Eclipse</a:t>
+            </a:r>
+            <a:r>
+              <a:rPr lang="it-IT" sz="2400" dirty="0" smtClean="0"/>
+              <a:t> come ambiente di sviluppo (utilizzando anche la struttura AST)</a:t>
+            </a:r>
+            <a:endParaRPr lang="it-IT" sz="2400" dirty="0" smtClean="0"/>
+          </a:p>
+        </p:txBody>
+      </p:sp>
+      <p:sp>
+        <p:nvSpPr>
+          <p:cNvPr id="13" name="Sottotitolo 2"/>
+          <p:cNvSpPr txBox="1">
+            <a:spLocks/>
+          </p:cNvSpPr>
+          <p:nvPr/>
+        </p:nvSpPr>
+        <p:spPr>
+          <a:xfrm>
+            <a:off x="3491880" y="4547981"/>
+            <a:ext cx="5493104" cy="969251"/>
+          </a:xfrm>
+          <a:prstGeom prst="rect">
+            <a:avLst/>
+          </a:prstGeom>
+        </p:spPr>
+        <p:txBody>
+          <a:bodyPr tIns="0">
+            <a:normAutofit/>
+          </a:bodyPr>
+          <a:lstStyle>
+            <a:lvl1pPr marL="27432" indent="0" algn="l" rtl="0" eaLnBrk="1" latinLnBrk="0" hangingPunct="1">
+              <a:lnSpc>
+                <a:spcPct val="100000"/>
+              </a:lnSpc>
+              <a:spcBef>
+                <a:spcPts val="600"/>
+              </a:spcBef>
+              <a:buClr>
+                <a:schemeClr val="accent1"/>
+              </a:buClr>
+              <a:buSzPct val="80000"/>
+              <a:buFont typeface="Wingdings 2"/>
+              <a:buNone/>
+              <a:defRPr kumimoji="0" sz="2600" kern="1200">
+                <a:solidFill>
+                  <a:schemeClr val="tx2">
+                    <a:shade val="30000"/>
+                    <a:satMod val="150000"/>
+                  </a:schemeClr>
+                </a:solidFill>
+                <a:latin typeface="+mn-lt"/>
+                <a:ea typeface="+mn-ea"/>
+                <a:cs typeface="+mn-cs"/>
+              </a:defRPr>
+            </a:lvl1pPr>
+            <a:lvl2pPr marL="457200" indent="0" algn="ctr" rtl="0" eaLnBrk="1" latinLnBrk="0" hangingPunct="1">
+              <a:lnSpc>
+                <a:spcPct val="100000"/>
+              </a:lnSpc>
+              <a:spcBef>
+                <a:spcPts val="550"/>
+              </a:spcBef>
+              <a:buClr>
+                <a:schemeClr val="accent1"/>
+              </a:buClr>
+              <a:buFont typeface="Verdana"/>
+              <a:buNone/>
+              <a:defRPr kumimoji="0" sz="2800" kern="1200">
+                <a:solidFill>
+                  <a:schemeClr val="tx1"/>
+                </a:solidFill>
+                <a:latin typeface="+mn-lt"/>
+                <a:ea typeface="+mn-ea"/>
+                <a:cs typeface="+mn-cs"/>
+              </a:defRPr>
+            </a:lvl2pPr>
+            <a:lvl3pPr marL="914400" indent="0" algn="ctr" rtl="0" eaLnBrk="1" latinLnBrk="0" hangingPunct="1">
+              <a:lnSpc>
+                <a:spcPct val="100000"/>
+              </a:lnSpc>
+              <a:spcBef>
+                <a:spcPct val="20000"/>
+              </a:spcBef>
+              <a:buClr>
+                <a:schemeClr val="accent2"/>
+              </a:buClr>
+              <a:buFont typeface="Wingdings 2"/>
+              <a:buNone/>
+              <a:defRPr kumimoji="0" sz="2400" kern="1200">
+                <a:solidFill>
+                  <a:schemeClr val="tx1"/>
+                </a:solidFill>
+                <a:latin typeface="+mn-lt"/>
+                <a:ea typeface="+mn-ea"/>
+                <a:cs typeface="+mn-cs"/>
+              </a:defRPr>
+            </a:lvl3pPr>
+            <a:lvl4pPr marL="1371600" indent="0" algn="ctr" rtl="0" eaLnBrk="1" latinLnBrk="0" hangingPunct="1">
+              <a:lnSpc>
+                <a:spcPct val="100000"/>
+              </a:lnSpc>
+              <a:spcBef>
+                <a:spcPct val="20000"/>
+              </a:spcBef>
+              <a:buClr>
+                <a:schemeClr val="accent3"/>
+              </a:buClr>
+              <a:buFont typeface="Wingdings 2"/>
+              <a:buNone/>
+              <a:defRPr kumimoji="0" sz="2000" kern="1200">
+                <a:solidFill>
+                  <a:schemeClr val="tx1"/>
+                </a:solidFill>
+                <a:latin typeface="+mn-lt"/>
+                <a:ea typeface="+mn-ea"/>
+                <a:cs typeface="+mn-cs"/>
+              </a:defRPr>
+            </a:lvl4pPr>
+            <a:lvl5pPr marL="1828800" indent="0" algn="ctr" rtl="0" eaLnBrk="1" latinLnBrk="0" hangingPunct="1">
+              <a:lnSpc>
+                <a:spcPct val="100000"/>
+              </a:lnSpc>
+              <a:spcBef>
+                <a:spcPct val="20000"/>
+              </a:spcBef>
+              <a:buClr>
+                <a:schemeClr val="accent4"/>
+              </a:buClr>
+              <a:buFont typeface="Wingdings 2"/>
+              <a:buNone/>
+              <a:defRPr kumimoji="0" sz="2000" kern="1200">
+                <a:solidFill>
+                  <a:schemeClr val="tx1"/>
+                </a:solidFill>
+                <a:latin typeface="+mn-lt"/>
+                <a:ea typeface="+mn-ea"/>
+                <a:cs typeface="+mn-cs"/>
+              </a:defRPr>
+            </a:lvl5pPr>
+            <a:lvl6pPr marL="2286000" indent="0" algn="ctr" rtl="0" eaLnBrk="1" latinLnBrk="0" hangingPunct="1">
+              <a:lnSpc>
+                <a:spcPct val="100000"/>
+              </a:lnSpc>
+              <a:spcBef>
+                <a:spcPct val="20000"/>
+              </a:spcBef>
+              <a:buClr>
+                <a:schemeClr val="accent5"/>
+              </a:buClr>
+              <a:buFont typeface="Wingdings 2"/>
+              <a:buNone/>
+              <a:defRPr kumimoji="0" sz="2000" kern="1200">
+                <a:solidFill>
+                  <a:schemeClr val="tx1"/>
+                </a:solidFill>
+                <a:latin typeface="+mn-lt"/>
+                <a:ea typeface="+mn-ea"/>
+                <a:cs typeface="+mn-cs"/>
+              </a:defRPr>
+            </a:lvl6pPr>
+            <a:lvl7pPr marL="2743200" indent="0" algn="ctr" rtl="0" eaLnBrk="1" latinLnBrk="0" hangingPunct="1">
+              <a:lnSpc>
+                <a:spcPct val="100000"/>
+              </a:lnSpc>
+              <a:spcBef>
+                <a:spcPct val="20000"/>
+              </a:spcBef>
+              <a:buClr>
+                <a:schemeClr val="accent6"/>
+              </a:buClr>
+              <a:buFont typeface="Wingdings 2"/>
+              <a:buNone/>
+              <a:defRPr kumimoji="0" sz="2000" kern="1200">
+                <a:solidFill>
+                  <a:schemeClr val="tx1"/>
+                </a:solidFill>
+                <a:latin typeface="+mn-lt"/>
+                <a:ea typeface="+mn-ea"/>
+                <a:cs typeface="+mn-cs"/>
+              </a:defRPr>
+            </a:lvl7pPr>
+            <a:lvl8pPr marL="3200400" indent="0" algn="ctr" rtl="0" eaLnBrk="1" latinLnBrk="0" hangingPunct="1">
+              <a:lnSpc>
+                <a:spcPct val="100000"/>
+              </a:lnSpc>
+              <a:spcBef>
+                <a:spcPct val="20000"/>
+              </a:spcBef>
+              <a:buClr>
+                <a:schemeClr val="accent6"/>
+              </a:buClr>
+              <a:buFont typeface="Wingdings 2"/>
+              <a:buNone/>
+              <a:defRPr kumimoji="0" sz="2000" kern="1200">
+                <a:solidFill>
+                  <a:schemeClr val="tx1"/>
+                </a:solidFill>
+                <a:latin typeface="+mn-lt"/>
+                <a:ea typeface="+mn-ea"/>
+                <a:cs typeface="+mn-cs"/>
+              </a:defRPr>
+            </a:lvl8pPr>
+            <a:lvl9pPr marL="3657600" indent="0" algn="ctr" rtl="0" eaLnBrk="1" latinLnBrk="0" hangingPunct="1">
+              <a:lnSpc>
+                <a:spcPct val="100000"/>
+              </a:lnSpc>
+              <a:spcBef>
+                <a:spcPct val="20000"/>
+              </a:spcBef>
+              <a:buClr>
+                <a:schemeClr val="accent6"/>
+              </a:buClr>
+              <a:buFont typeface="Wingdings 2"/>
+              <a:buNone/>
+              <a:defRPr kumimoji="0" sz="2000" kern="1200">
+                <a:solidFill>
+                  <a:schemeClr val="tx1"/>
+                </a:solidFill>
+                <a:latin typeface="+mn-lt"/>
+                <a:ea typeface="+mn-ea"/>
+                <a:cs typeface="+mn-cs"/>
+              </a:defRPr>
+            </a:lvl9pPr>
+            <a:extLst/>
+          </a:lstStyle>
+          <a:p>
+            <a:r>
+              <a:rPr lang="it-IT" sz="2400" dirty="0" smtClean="0"/>
+              <a:t>Z3 per eseguire i test di </a:t>
+            </a:r>
+            <a:r>
+              <a:rPr lang="it-IT" sz="2400" dirty="0" err="1" smtClean="0"/>
+              <a:t>soddisfacibilità</a:t>
+            </a:r>
+            <a:endParaRPr lang="it-IT" sz="2400" dirty="0" smtClean="0"/>
+          </a:p>
+        </p:txBody>
+      </p:sp>
+      <p:sp>
+        <p:nvSpPr>
+          <p:cNvPr id="14" name="Sottotitolo 2"/>
+          <p:cNvSpPr txBox="1">
+            <a:spLocks/>
+          </p:cNvSpPr>
+          <p:nvPr/>
+        </p:nvSpPr>
+        <p:spPr>
+          <a:xfrm>
+            <a:off x="3471384" y="5484085"/>
+            <a:ext cx="5493104" cy="969251"/>
+          </a:xfrm>
+          <a:prstGeom prst="rect">
+            <a:avLst/>
+          </a:prstGeom>
+        </p:spPr>
+        <p:txBody>
+          <a:bodyPr tIns="0">
+            <a:normAutofit/>
+          </a:bodyPr>
+          <a:lstStyle>
+            <a:lvl1pPr marL="27432" indent="0" algn="l" rtl="0" eaLnBrk="1" latinLnBrk="0" hangingPunct="1">
+              <a:lnSpc>
+                <a:spcPct val="100000"/>
+              </a:lnSpc>
+              <a:spcBef>
+                <a:spcPts val="600"/>
+              </a:spcBef>
+              <a:buClr>
+                <a:schemeClr val="accent1"/>
+              </a:buClr>
+              <a:buSzPct val="80000"/>
+              <a:buFont typeface="Wingdings 2"/>
+              <a:buNone/>
+              <a:defRPr kumimoji="0" sz="2600" kern="1200">
+                <a:solidFill>
+                  <a:schemeClr val="tx2">
+                    <a:shade val="30000"/>
+                    <a:satMod val="150000"/>
+                  </a:schemeClr>
+                </a:solidFill>
+                <a:latin typeface="+mn-lt"/>
+                <a:ea typeface="+mn-ea"/>
+                <a:cs typeface="+mn-cs"/>
+              </a:defRPr>
+            </a:lvl1pPr>
+            <a:lvl2pPr marL="457200" indent="0" algn="ctr" rtl="0" eaLnBrk="1" latinLnBrk="0" hangingPunct="1">
+              <a:lnSpc>
+                <a:spcPct val="100000"/>
+              </a:lnSpc>
+              <a:spcBef>
+                <a:spcPts val="550"/>
+              </a:spcBef>
+              <a:buClr>
+                <a:schemeClr val="accent1"/>
+              </a:buClr>
+              <a:buFont typeface="Verdana"/>
+              <a:buNone/>
+              <a:defRPr kumimoji="0" sz="2800" kern="1200">
+                <a:solidFill>
+                  <a:schemeClr val="tx1"/>
+                </a:solidFill>
+                <a:latin typeface="+mn-lt"/>
+                <a:ea typeface="+mn-ea"/>
+                <a:cs typeface="+mn-cs"/>
+              </a:defRPr>
+            </a:lvl2pPr>
+            <a:lvl3pPr marL="914400" indent="0" algn="ctr" rtl="0" eaLnBrk="1" latinLnBrk="0" hangingPunct="1">
+              <a:lnSpc>
+                <a:spcPct val="100000"/>
+              </a:lnSpc>
+              <a:spcBef>
+                <a:spcPct val="20000"/>
+              </a:spcBef>
+              <a:buClr>
+                <a:schemeClr val="accent2"/>
+              </a:buClr>
+              <a:buFont typeface="Wingdings 2"/>
+              <a:buNone/>
+              <a:defRPr kumimoji="0" sz="2400" kern="1200">
+                <a:solidFill>
+                  <a:schemeClr val="tx1"/>
+                </a:solidFill>
+                <a:latin typeface="+mn-lt"/>
+                <a:ea typeface="+mn-ea"/>
+                <a:cs typeface="+mn-cs"/>
+              </a:defRPr>
+            </a:lvl3pPr>
+            <a:lvl4pPr marL="1371600" indent="0" algn="ctr" rtl="0" eaLnBrk="1" latinLnBrk="0" hangingPunct="1">
+              <a:lnSpc>
+                <a:spcPct val="100000"/>
+              </a:lnSpc>
+              <a:spcBef>
+                <a:spcPct val="20000"/>
+              </a:spcBef>
+              <a:buClr>
+                <a:schemeClr val="accent3"/>
+              </a:buClr>
+              <a:buFont typeface="Wingdings 2"/>
+              <a:buNone/>
+              <a:defRPr kumimoji="0" sz="2000" kern="1200">
+                <a:solidFill>
+                  <a:schemeClr val="tx1"/>
+                </a:solidFill>
+                <a:latin typeface="+mn-lt"/>
+                <a:ea typeface="+mn-ea"/>
+                <a:cs typeface="+mn-cs"/>
+              </a:defRPr>
+            </a:lvl4pPr>
+            <a:lvl5pPr marL="1828800" indent="0" algn="ctr" rtl="0" eaLnBrk="1" latinLnBrk="0" hangingPunct="1">
+              <a:lnSpc>
+                <a:spcPct val="100000"/>
+              </a:lnSpc>
+              <a:spcBef>
+                <a:spcPct val="20000"/>
+              </a:spcBef>
+              <a:buClr>
+                <a:schemeClr val="accent4"/>
+              </a:buClr>
+              <a:buFont typeface="Wingdings 2"/>
+              <a:buNone/>
+              <a:defRPr kumimoji="0" sz="2000" kern="1200">
+                <a:solidFill>
+                  <a:schemeClr val="tx1"/>
+                </a:solidFill>
+                <a:latin typeface="+mn-lt"/>
+                <a:ea typeface="+mn-ea"/>
+                <a:cs typeface="+mn-cs"/>
+              </a:defRPr>
+            </a:lvl5pPr>
+            <a:lvl6pPr marL="2286000" indent="0" algn="ctr" rtl="0" eaLnBrk="1" latinLnBrk="0" hangingPunct="1">
+              <a:lnSpc>
+                <a:spcPct val="100000"/>
+              </a:lnSpc>
+              <a:spcBef>
+                <a:spcPct val="20000"/>
+              </a:spcBef>
+              <a:buClr>
+                <a:schemeClr val="accent5"/>
+              </a:buClr>
+              <a:buFont typeface="Wingdings 2"/>
+              <a:buNone/>
+              <a:defRPr kumimoji="0" sz="2000" kern="1200">
+                <a:solidFill>
+                  <a:schemeClr val="tx1"/>
+                </a:solidFill>
+                <a:latin typeface="+mn-lt"/>
+                <a:ea typeface="+mn-ea"/>
+                <a:cs typeface="+mn-cs"/>
+              </a:defRPr>
+            </a:lvl6pPr>
+            <a:lvl7pPr marL="2743200" indent="0" algn="ctr" rtl="0" eaLnBrk="1" latinLnBrk="0" hangingPunct="1">
+              <a:lnSpc>
+                <a:spcPct val="100000"/>
+              </a:lnSpc>
+              <a:spcBef>
+                <a:spcPct val="20000"/>
+              </a:spcBef>
+              <a:buClr>
+                <a:schemeClr val="accent6"/>
+              </a:buClr>
+              <a:buFont typeface="Wingdings 2"/>
+              <a:buNone/>
+              <a:defRPr kumimoji="0" sz="2000" kern="1200">
+                <a:solidFill>
+                  <a:schemeClr val="tx1"/>
+                </a:solidFill>
+                <a:latin typeface="+mn-lt"/>
+                <a:ea typeface="+mn-ea"/>
+                <a:cs typeface="+mn-cs"/>
+              </a:defRPr>
+            </a:lvl7pPr>
+            <a:lvl8pPr marL="3200400" indent="0" algn="ctr" rtl="0" eaLnBrk="1" latinLnBrk="0" hangingPunct="1">
+              <a:lnSpc>
+                <a:spcPct val="100000"/>
+              </a:lnSpc>
+              <a:spcBef>
+                <a:spcPct val="20000"/>
+              </a:spcBef>
+              <a:buClr>
+                <a:schemeClr val="accent6"/>
+              </a:buClr>
+              <a:buFont typeface="Wingdings 2"/>
+              <a:buNone/>
+              <a:defRPr kumimoji="0" sz="2000" kern="1200">
+                <a:solidFill>
+                  <a:schemeClr val="tx1"/>
+                </a:solidFill>
+                <a:latin typeface="+mn-lt"/>
+                <a:ea typeface="+mn-ea"/>
+                <a:cs typeface="+mn-cs"/>
+              </a:defRPr>
+            </a:lvl8pPr>
+            <a:lvl9pPr marL="3657600" indent="0" algn="ctr" rtl="0" eaLnBrk="1" latinLnBrk="0" hangingPunct="1">
+              <a:lnSpc>
+                <a:spcPct val="100000"/>
+              </a:lnSpc>
+              <a:spcBef>
+                <a:spcPct val="20000"/>
+              </a:spcBef>
+              <a:buClr>
+                <a:schemeClr val="accent6"/>
+              </a:buClr>
+              <a:buFont typeface="Wingdings 2"/>
+              <a:buNone/>
+              <a:defRPr kumimoji="0" sz="2000" kern="1200">
+                <a:solidFill>
+                  <a:schemeClr val="tx1"/>
+                </a:solidFill>
+                <a:latin typeface="+mn-lt"/>
+                <a:ea typeface="+mn-ea"/>
+                <a:cs typeface="+mn-cs"/>
+              </a:defRPr>
+            </a:lvl9pPr>
+            <a:extLst/>
+          </a:lstStyle>
+          <a:p>
+            <a:r>
+              <a:rPr lang="it-IT" sz="2400" dirty="0" err="1" smtClean="0"/>
+              <a:t>Ant</a:t>
+            </a:r>
+            <a:r>
+              <a:rPr lang="it-IT" sz="2400" dirty="0" smtClean="0"/>
+              <a:t> per la creazione dei file di automazione</a:t>
+            </a:r>
+            <a:endParaRPr lang="it-IT" sz="2400" dirty="0" smtClean="0"/>
+          </a:p>
+        </p:txBody>
+      </p:sp>
+    </p:spTree>
+    <p:extLst>
+      <p:ext uri="{BB962C8B-B14F-4D97-AF65-F5344CB8AC3E}">
+        <p14:creationId xmlns:p14="http://schemas.microsoft.com/office/powerpoint/2010/main" val="1232129031"/>
+      </p:ext>
+    </p:extLst>
+  </p:cSld>
+  <p:clrMapOvr>
+    <a:masterClrMapping/>
+  </p:clrMapOvr>
+  <p:transition spd="slow">
+    <p:push dir="u"/>
+  </p:transition>
+  <p:timing>
+    <p:tnLst>
+      <p:par>
+        <p:cTn id="1" dur="indefinite" restart="never" nodeType="tmRoot">
+          <p:childTnLst>
+            <p:seq concurrent="1" nextAc="seek">
+              <p:cTn id="2" dur="indefinite" nodeType="mainSeq">
+                <p:childTnLst>
+                  <p:par>
+                    <p:cTn id="3" fill="hold">
+                      <p:stCondLst>
+                        <p:cond delay="indefinite"/>
+                        <p:cond evt="onBegin" delay="0">
+                          <p:tn val="2"/>
+                        </p:cond>
+                      </p:stCondLst>
+                      <p:childTnLst>
+                        <p:par>
+                          <p:cTn id="4" fill="hold">
+                            <p:stCondLst>
+                              <p:cond delay="0"/>
+                            </p:stCondLst>
+                            <p:childTnLst>
+                              <p:par>
+                                <p:cTn id="5" presetID="16" presetClass="entr" presetSubtype="21" fill="hold" nodeType="afterEffect">
+                                  <p:stCondLst>
+                                    <p:cond delay="0"/>
+                                  </p:stCondLst>
+                                  <p:childTnLst>
+                                    <p:set>
+                                      <p:cBhvr>
+                                        <p:cTn id="6" dur="1" fill="hold">
+                                          <p:stCondLst>
+                                            <p:cond delay="0"/>
+                                          </p:stCondLst>
+                                        </p:cTn>
+                                        <p:tgtEl>
+                                          <p:spTgt spid="7"/>
+                                        </p:tgtEl>
+                                        <p:attrNameLst>
+                                          <p:attrName>style.visibility</p:attrName>
+                                        </p:attrNameLst>
+                                      </p:cBhvr>
+                                      <p:to>
+                                        <p:strVal val="visible"/>
+                                      </p:to>
+                                    </p:set>
+                                    <p:animEffect transition="in" filter="barn(inVertical)">
+                                      <p:cBhvr>
+                                        <p:cTn id="7" dur="500"/>
+                                        <p:tgtEl>
+                                          <p:spTgt spid="7"/>
+                                        </p:tgtEl>
+                                      </p:cBhvr>
+                                    </p:animEffect>
+                                  </p:childTnLst>
+                                </p:cTn>
+                              </p:par>
+                            </p:childTnLst>
+                          </p:cTn>
+                        </p:par>
+                        <p:par>
+                          <p:cTn id="8" fill="hold">
+                            <p:stCondLst>
+                              <p:cond delay="500"/>
+                            </p:stCondLst>
+                            <p:childTnLst>
+                              <p:par>
+                                <p:cTn id="9" presetID="10" presetClass="entr" presetSubtype="0" fill="hold" nodeType="afterEffect">
+                                  <p:stCondLst>
+                                    <p:cond delay="0"/>
+                                  </p:stCondLst>
+                                  <p:childTnLst>
+                                    <p:set>
+                                      <p:cBhvr>
+                                        <p:cTn id="10" dur="1" fill="hold">
+                                          <p:stCondLst>
+                                            <p:cond delay="0"/>
+                                          </p:stCondLst>
+                                        </p:cTn>
+                                        <p:tgtEl>
+                                          <p:spTgt spid="3">
+                                            <p:txEl>
+                                              <p:pRg st="0" end="0"/>
+                                            </p:txEl>
+                                          </p:spTgt>
+                                        </p:tgtEl>
+                                        <p:attrNameLst>
+                                          <p:attrName>style.visibility</p:attrName>
+                                        </p:attrNameLst>
+                                      </p:cBhvr>
+                                      <p:to>
+                                        <p:strVal val="visible"/>
+                                      </p:to>
+                                    </p:set>
+                                    <p:animEffect transition="in" filter="fade">
+                                      <p:cBhvr>
+                                        <p:cTn id="11" dur="500"/>
+                                        <p:tgtEl>
+                                          <p:spTgt spid="3">
+                                            <p:txEl>
+                                              <p:pRg st="0" end="0"/>
+                                            </p:txEl>
+                                          </p:spTgt>
+                                        </p:tgtEl>
+                                      </p:cBhvr>
+                                    </p:animEffect>
+                                  </p:childTnLst>
+                                </p:cTn>
+                              </p:par>
+                            </p:childTnLst>
+                          </p:cTn>
+                        </p:par>
+                      </p:childTnLst>
+                    </p:cTn>
+                  </p:par>
+                  <p:par>
+                    <p:cTn id="12" fill="hold">
+                      <p:stCondLst>
+                        <p:cond delay="indefinite"/>
+                      </p:stCondLst>
+                      <p:childTnLst>
+                        <p:par>
+                          <p:cTn id="13" fill="hold">
+                            <p:stCondLst>
+                              <p:cond delay="0"/>
+                            </p:stCondLst>
+                            <p:childTnLst>
+                              <p:par>
+                                <p:cTn id="14" presetID="16" presetClass="entr" presetSubtype="21" fill="hold" nodeType="clickEffect">
+                                  <p:stCondLst>
+                                    <p:cond delay="0"/>
+                                  </p:stCondLst>
+                                  <p:childTnLst>
+                                    <p:set>
+                                      <p:cBhvr>
+                                        <p:cTn id="15" dur="1" fill="hold">
+                                          <p:stCondLst>
+                                            <p:cond delay="0"/>
+                                          </p:stCondLst>
+                                        </p:cTn>
+                                        <p:tgtEl>
+                                          <p:spTgt spid="9"/>
+                                        </p:tgtEl>
+                                        <p:attrNameLst>
+                                          <p:attrName>style.visibility</p:attrName>
+                                        </p:attrNameLst>
+                                      </p:cBhvr>
+                                      <p:to>
+                                        <p:strVal val="visible"/>
+                                      </p:to>
+                                    </p:set>
+                                    <p:animEffect transition="in" filter="barn(inVertical)">
+                                      <p:cBhvr>
+                                        <p:cTn id="16" dur="500"/>
+                                        <p:tgtEl>
+                                          <p:spTgt spid="9"/>
+                                        </p:tgtEl>
+                                      </p:cBhvr>
+                                    </p:animEffect>
+                                  </p:childTnLst>
+                                </p:cTn>
+                              </p:par>
+                            </p:childTnLst>
+                          </p:cTn>
+                        </p:par>
+                        <p:par>
+                          <p:cTn id="17" fill="hold">
+                            <p:stCondLst>
+                              <p:cond delay="500"/>
+                            </p:stCondLst>
+                            <p:childTnLst>
+                              <p:par>
+                                <p:cTn id="18" presetID="10" presetClass="entr" presetSubtype="0" fill="hold" grpId="0" nodeType="afterEffect">
+                                  <p:stCondLst>
+                                    <p:cond delay="0"/>
+                                  </p:stCondLst>
+                                  <p:childTnLst>
+                                    <p:set>
+                                      <p:cBhvr>
+                                        <p:cTn id="19" dur="1" fill="hold">
+                                          <p:stCondLst>
+                                            <p:cond delay="0"/>
+                                          </p:stCondLst>
+                                        </p:cTn>
+                                        <p:tgtEl>
+                                          <p:spTgt spid="12"/>
+                                        </p:tgtEl>
+                                        <p:attrNameLst>
+                                          <p:attrName>style.visibility</p:attrName>
+                                        </p:attrNameLst>
+                                      </p:cBhvr>
+                                      <p:to>
+                                        <p:strVal val="visible"/>
+                                      </p:to>
+                                    </p:set>
+                                    <p:animEffect transition="in" filter="fade">
+                                      <p:cBhvr>
+                                        <p:cTn id="20" dur="500"/>
+                                        <p:tgtEl>
+                                          <p:spTgt spid="12"/>
+                                        </p:tgtEl>
+                                      </p:cBhvr>
+                                    </p:animEffect>
+                                  </p:childTnLst>
+                                </p:cTn>
+                              </p:par>
+                            </p:childTnLst>
+                          </p:cTn>
+                        </p:par>
+                      </p:childTnLst>
+                    </p:cTn>
+                  </p:par>
+                  <p:par>
+                    <p:cTn id="21" fill="hold">
+                      <p:stCondLst>
+                        <p:cond delay="indefinite"/>
+                      </p:stCondLst>
+                      <p:childTnLst>
+                        <p:par>
+                          <p:cTn id="22" fill="hold">
+                            <p:stCondLst>
+                              <p:cond delay="0"/>
+                            </p:stCondLst>
+                            <p:childTnLst>
+                              <p:par>
+                                <p:cTn id="23" presetID="16" presetClass="entr" presetSubtype="21" fill="hold" nodeType="clickEffect">
+                                  <p:stCondLst>
+                                    <p:cond delay="0"/>
+                                  </p:stCondLst>
+                                  <p:childTnLst>
+                                    <p:set>
+                                      <p:cBhvr>
+                                        <p:cTn id="24" dur="1" fill="hold">
+                                          <p:stCondLst>
+                                            <p:cond delay="0"/>
+                                          </p:stCondLst>
+                                        </p:cTn>
+                                        <p:tgtEl>
+                                          <p:spTgt spid="11"/>
+                                        </p:tgtEl>
+                                        <p:attrNameLst>
+                                          <p:attrName>style.visibility</p:attrName>
+                                        </p:attrNameLst>
+                                      </p:cBhvr>
+                                      <p:to>
+                                        <p:strVal val="visible"/>
+                                      </p:to>
+                                    </p:set>
+                                    <p:animEffect transition="in" filter="barn(inVertical)">
+                                      <p:cBhvr>
+                                        <p:cTn id="25" dur="500"/>
+                                        <p:tgtEl>
+                                          <p:spTgt spid="11"/>
+                                        </p:tgtEl>
+                                      </p:cBhvr>
+                                    </p:animEffect>
+                                  </p:childTnLst>
+                                </p:cTn>
+                              </p:par>
+                            </p:childTnLst>
+                          </p:cTn>
+                        </p:par>
+                        <p:par>
+                          <p:cTn id="26" fill="hold">
+                            <p:stCondLst>
+                              <p:cond delay="500"/>
+                            </p:stCondLst>
+                            <p:childTnLst>
+                              <p:par>
+                                <p:cTn id="27" presetID="10" presetClass="entr" presetSubtype="0" fill="hold" grpId="0" nodeType="afterEffect">
+                                  <p:stCondLst>
+                                    <p:cond delay="0"/>
+                                  </p:stCondLst>
+                                  <p:childTnLst>
+                                    <p:set>
+                                      <p:cBhvr>
+                                        <p:cTn id="28" dur="1" fill="hold">
+                                          <p:stCondLst>
+                                            <p:cond delay="0"/>
+                                          </p:stCondLst>
+                                        </p:cTn>
+                                        <p:tgtEl>
+                                          <p:spTgt spid="13"/>
+                                        </p:tgtEl>
+                                        <p:attrNameLst>
+                                          <p:attrName>style.visibility</p:attrName>
+                                        </p:attrNameLst>
+                                      </p:cBhvr>
+                                      <p:to>
+                                        <p:strVal val="visible"/>
+                                      </p:to>
+                                    </p:set>
+                                    <p:animEffect transition="in" filter="fade">
+                                      <p:cBhvr>
+                                        <p:cTn id="29" dur="500"/>
+                                        <p:tgtEl>
+                                          <p:spTgt spid="13"/>
+                                        </p:tgtEl>
+                                      </p:cBhvr>
+                                    </p:animEffect>
+                                  </p:childTnLst>
+                                </p:cTn>
+                              </p:par>
+                            </p:childTnLst>
+                          </p:cTn>
+                        </p:par>
+                      </p:childTnLst>
+                    </p:cTn>
+                  </p:par>
+                  <p:par>
+                    <p:cTn id="30" fill="hold">
+                      <p:stCondLst>
+                        <p:cond delay="indefinite"/>
+                      </p:stCondLst>
+                      <p:childTnLst>
+                        <p:par>
+                          <p:cTn id="31" fill="hold">
+                            <p:stCondLst>
+                              <p:cond delay="0"/>
+                            </p:stCondLst>
+                            <p:childTnLst>
+                              <p:par>
+                                <p:cTn id="32" presetID="16" presetClass="entr" presetSubtype="21" fill="hold" nodeType="clickEffect">
+                                  <p:stCondLst>
+                                    <p:cond delay="0"/>
+                                  </p:stCondLst>
+                                  <p:childTnLst>
+                                    <p:set>
+                                      <p:cBhvr>
+                                        <p:cTn id="33" dur="1" fill="hold">
+                                          <p:stCondLst>
+                                            <p:cond delay="0"/>
+                                          </p:stCondLst>
+                                        </p:cTn>
+                                        <p:tgtEl>
+                                          <p:spTgt spid="5"/>
+                                        </p:tgtEl>
+                                        <p:attrNameLst>
+                                          <p:attrName>style.visibility</p:attrName>
+                                        </p:attrNameLst>
+                                      </p:cBhvr>
+                                      <p:to>
+                                        <p:strVal val="visible"/>
+                                      </p:to>
+                                    </p:set>
+                                    <p:animEffect transition="in" filter="barn(inVertical)">
+                                      <p:cBhvr>
+                                        <p:cTn id="34" dur="500"/>
+                                        <p:tgtEl>
+                                          <p:spTgt spid="5"/>
+                                        </p:tgtEl>
+                                      </p:cBhvr>
+                                    </p:animEffect>
+                                  </p:childTnLst>
+                                </p:cTn>
+                              </p:par>
+                            </p:childTnLst>
+                          </p:cTn>
+                        </p:par>
+                        <p:par>
+                          <p:cTn id="35" fill="hold">
+                            <p:stCondLst>
+                              <p:cond delay="500"/>
+                            </p:stCondLst>
+                            <p:childTnLst>
+                              <p:par>
+                                <p:cTn id="36" presetID="10" presetClass="entr" presetSubtype="0" fill="hold" grpId="0" nodeType="afterEffect">
+                                  <p:stCondLst>
+                                    <p:cond delay="0"/>
+                                  </p:stCondLst>
+                                  <p:childTnLst>
+                                    <p:set>
+                                      <p:cBhvr>
+                                        <p:cTn id="37" dur="1" fill="hold">
+                                          <p:stCondLst>
+                                            <p:cond delay="0"/>
+                                          </p:stCondLst>
+                                        </p:cTn>
+                                        <p:tgtEl>
+                                          <p:spTgt spid="14"/>
+                                        </p:tgtEl>
+                                        <p:attrNameLst>
+                                          <p:attrName>style.visibility</p:attrName>
+                                        </p:attrNameLst>
+                                      </p:cBhvr>
+                                      <p:to>
+                                        <p:strVal val="visible"/>
+                                      </p:to>
+                                    </p:set>
+                                    <p:animEffect transition="in" filter="fade">
+                                      <p:cBhvr>
+                                        <p:cTn id="38" dur="500"/>
+                                        <p:tgtEl>
+                                          <p:spTgt spid="14"/>
+                                        </p:tgtEl>
+                                      </p:cBhvr>
+                                    </p:animEffect>
+                                  </p:childTnLst>
+                                </p:cTn>
+                              </p:par>
+                            </p:childTnLst>
+                          </p:cTn>
+                        </p:par>
+                      </p:childTnLst>
+                    </p:cTn>
+                  </p:par>
+                </p:childTnLst>
+              </p:cTn>
+              <p:prevCondLst>
+                <p:cond evt="onPrev" delay="0">
+                  <p:tgtEl>
+                    <p:sldTgt/>
+                  </p:tgtEl>
+                </p:cond>
+              </p:prevCondLst>
+              <p:nextCondLst>
+                <p:cond evt="onNext" delay="0">
+                  <p:tgtEl>
+                    <p:sldTgt/>
+                  </p:tgtEl>
+                </p:cond>
+              </p:nextCondLst>
+            </p:seq>
+          </p:childTnLst>
+        </p:cTn>
+      </p:par>
+    </p:tnLst>
+    <p:bldLst>
+      <p:bldP spid="12" grpId="0"/>
+      <p:bldP spid="13" grpId="0"/>
+      <p:bldP spid="14" grpId="0"/>
+    </p:bldLst>
+  </p:timing>
+</p:sld>
+</file>
+
+<file path=ppt/slides/slide13.xml><?xml version="1.0" encoding="utf-8"?>
+<p:sld xmlns:a="http://schemas.openxmlformats.org/drawingml/2006/main" xmlns:r="http://schemas.openxmlformats.org/officeDocument/2006/relationships" xmlns:p="http://schemas.openxmlformats.org/presentationml/2006/main">
+  <p:cSld>
+    <p:spTree>
+      <p:nvGrpSpPr>
+        <p:cNvPr id="1" name=""/>
+        <p:cNvGrpSpPr/>
+        <p:nvPr/>
+      </p:nvGrpSpPr>
+      <p:grpSpPr>
+        <a:xfrm>
+          <a:off x="0" y="0"/>
+          <a:ext cx="0" cy="0"/>
+          <a:chOff x="0" y="0"/>
+          <a:chExt cx="0" cy="0"/>
+        </a:xfrm>
+      </p:grpSpPr>
+      <p:sp>
+        <p:nvSpPr>
+          <p:cNvPr id="2" name="Titolo 1"/>
+          <p:cNvSpPr>
+            <a:spLocks noGrp="1"/>
+          </p:cNvSpPr>
+          <p:nvPr>
+            <p:ph type="ctrTitle"/>
+          </p:nvPr>
+        </p:nvSpPr>
+        <p:spPr>
+          <a:xfrm>
+            <a:off x="1432560" y="359898"/>
+            <a:ext cx="7406640" cy="764846"/>
+          </a:xfrm>
+        </p:spPr>
+        <p:txBody>
+          <a:bodyPr>
+            <a:normAutofit/>
+          </a:bodyPr>
+          <a:lstStyle/>
+          <a:p>
+            <a:pPr algn="ctr"/>
+            <a:r>
+              <a:rPr lang="it-IT" sz="3200" dirty="0" smtClean="0"/>
               <a:t>Risultati conseguiti</a:t>
             </a:r>
             <a:endParaRPr lang="it-IT" sz="3200" dirty="0"/>
@@ -5750,30 +7097,21 @@
                             </p:childTnLst>
                           </p:cTn>
                         </p:par>
-                      </p:childTnLst>
-                    </p:cTn>
-                  </p:par>
-                  <p:par>
-                    <p:cTn id="13" fill="hold">
-                      <p:stCondLst>
-                        <p:cond delay="indefinite"/>
-                      </p:stCondLst>
-                      <p:childTnLst>
                         <p:par>
-                          <p:cTn id="14" fill="hold">
+                          <p:cTn id="13" fill="hold">
                             <p:stCondLst>
-                              <p:cond delay="0"/>
+                              <p:cond delay="1000"/>
                             </p:stCondLst>
                             <p:childTnLst>
                               <p:par>
-                                <p:cTn id="15" presetID="2" presetClass="entr" presetSubtype="4" fill="hold" nodeType="clickEffect">
+                                <p:cTn id="14" presetID="2" presetClass="entr" presetSubtype="4" fill="hold" nodeType="afterEffect">
                                   <p:stCondLst>
-                                    <p:cond delay="0"/>
+                                    <p:cond delay="250"/>
                                   </p:stCondLst>
                                   <p:childTnLst>
                                     <p:set>
                                       <p:cBhvr>
-                                        <p:cTn id="16" dur="1" fill="hold">
+                                        <p:cTn id="15" dur="1" fill="hold">
                                           <p:stCondLst>
                                             <p:cond delay="0"/>
                                           </p:stCondLst>
@@ -5795,7 +7133,7 @@
                                     </p:set>
                                     <p:anim calcmode="lin" valueType="num">
                                       <p:cBhvr additive="base">
-                                        <p:cTn id="17" dur="500" fill="hold"/>
+                                        <p:cTn id="16" dur="500" fill="hold"/>
                                         <p:tgtEl>
                                           <p:spTgt spid="3">
                                             <p:txEl>
@@ -5822,7 +7160,7 @@
                                     </p:anim>
                                     <p:anim calcmode="lin" valueType="num">
                                       <p:cBhvr additive="base">
-                                        <p:cTn id="18" dur="500" fill="hold"/>
+                                        <p:cTn id="17" dur="500" fill="hold"/>
                                         <p:tgtEl>
                                           <p:spTgt spid="3">
                                             <p:txEl>
@@ -5854,20 +7192,20 @@
                           </p:cTn>
                         </p:par>
                         <p:par>
-                          <p:cTn id="19" fill="hold">
+                          <p:cTn id="18" fill="hold">
                             <p:stCondLst>
-                              <p:cond delay="500"/>
+                              <p:cond delay="1750"/>
                             </p:stCondLst>
                             <p:childTnLst>
                               <p:par>
-                                <p:cTn id="20" presetID="16" presetClass="entr" presetSubtype="21" fill="hold" nodeType="afterEffect">
+                                <p:cTn id="19" presetID="16" presetClass="entr" presetSubtype="21" fill="hold" nodeType="afterEffect">
                                   <p:stCondLst>
                                     <p:cond delay="0"/>
                                   </p:stCondLst>
                                   <p:childTnLst>
                                     <p:set>
                                       <p:cBhvr>
-                                        <p:cTn id="21" dur="1" fill="hold">
+                                        <p:cTn id="20" dur="1" fill="hold">
                                           <p:stCondLst>
                                             <p:cond delay="0"/>
                                           </p:stCondLst>
@@ -5885,7 +7223,7 @@
                                     </p:set>
                                     <p:animEffect transition="in" filter="barn(inVertical)">
                                       <p:cBhvr>
-                                        <p:cTn id="22" dur="500"/>
+                                        <p:cTn id="21" dur="500"/>
                                         <p:tgtEl>
                                           <p:spTgt spid="6"/>
                                         </p:tgtEl>
@@ -5925,7 +7263,7 @@
 </p:sld>
 </file>
 
-<file path=ppt/slides/slide13.xml><?xml version="1.0" encoding="utf-8"?>
+<file path=ppt/slides/slide14.xml><?xml version="1.0" encoding="utf-8"?>
 <p:sld xmlns:a="http://schemas.openxmlformats.org/drawingml/2006/main" xmlns:r="http://schemas.openxmlformats.org/officeDocument/2006/relationships" xmlns:p="http://schemas.openxmlformats.org/presentationml/2006/main">
   <p:cSld>
     <p:spTree>
@@ -6531,7 +7869,7 @@
 </p:sld>
 </file>
 
-<file path=ppt/slides/slide14.xml><?xml version="1.0" encoding="utf-8"?>
+<file path=ppt/slides/slide15.xml><?xml version="1.0" encoding="utf-8"?>
 <p:sld xmlns:a="http://schemas.openxmlformats.org/drawingml/2006/main" xmlns:r="http://schemas.openxmlformats.org/officeDocument/2006/relationships" xmlns:p="http://schemas.openxmlformats.org/presentationml/2006/main">
   <p:cSld>
     <p:spTree>
@@ -7106,7 +8444,7 @@
 </p:sld>
 </file>
 
-<file path=ppt/slides/slide15.xml><?xml version="1.0" encoding="utf-8"?>
+<file path=ppt/slides/slide16.xml><?xml version="1.0" encoding="utf-8"?>
 <p:sld xmlns:a="http://schemas.openxmlformats.org/drawingml/2006/main" xmlns:r="http://schemas.openxmlformats.org/officeDocument/2006/relationships" xmlns:p="http://schemas.openxmlformats.org/presentationml/2006/main">
   <p:cSld>
     <p:spTree>
@@ -7469,6 +8807,9 @@
                     <p:cTn id="3" fill="hold">
                       <p:stCondLst>
                         <p:cond delay="indefinite"/>
+                        <p:cond evt="onBegin" delay="0">
+                          <p:tn val="2"/>
+                        </p:cond>
                       </p:stCondLst>
                       <p:childTnLst>
                         <p:par>
@@ -7478,9 +8819,9 @@
                             </p:stCondLst>
                             <p:childTnLst>
                               <p:par>
-                                <p:cTn id="5" presetID="2" presetClass="entr" presetSubtype="4" fill="hold" nodeType="clickEffect">
+                                <p:cTn id="5" presetID="2" presetClass="entr" presetSubtype="4" fill="hold" nodeType="afterEffect">
                                   <p:stCondLst>
-                                    <p:cond delay="0"/>
+                                    <p:cond delay="250"/>
                                   </p:stCondLst>
                                   <p:childTnLst>
                                     <p:set>
@@ -7805,7 +9146,9 @@
           </a:xfrm>
         </p:spPr>
         <p:txBody>
-          <a:bodyPr/>
+          <a:bodyPr>
+            <a:normAutofit fontScale="92500" lnSpcReduction="10000"/>
+          </a:bodyPr>
           <a:lstStyle/>
           <a:p>
             <a:pPr marL="484632" indent="-457200">
@@ -7856,8 +9199,26 @@
             </a:pPr>
             <a:r>
               <a:rPr lang="it-IT" dirty="0" smtClean="0"/>
-              <a:t>Fasi del progetto</a:t>
-            </a:r>
+              <a:t>Fasi del </a:t>
+            </a:r>
+            <a:r>
+              <a:rPr lang="it-IT" dirty="0" smtClean="0"/>
+              <a:t>progetto</a:t>
+            </a:r>
+          </a:p>
+          <a:p>
+            <a:pPr marL="484632" indent="-457200">
+              <a:lnSpc>
+                <a:spcPct val="150000"/>
+              </a:lnSpc>
+              <a:buFont typeface="Wingdings" panose="05000000000000000000" pitchFamily="2" charset="2"/>
+              <a:buChar char="q"/>
+            </a:pPr>
+            <a:r>
+              <a:rPr lang="it-IT" dirty="0" smtClean="0"/>
+              <a:t>Risorse software utilizzate</a:t>
+            </a:r>
+            <a:endParaRPr lang="it-IT" dirty="0" smtClean="0"/>
           </a:p>
           <a:p>
             <a:pPr marL="484632" indent="-457200">
@@ -7913,6 +9274,9 @@
                     <p:cTn id="3" fill="hold">
                       <p:stCondLst>
                         <p:cond delay="indefinite"/>
+                        <p:cond evt="onBegin" delay="0">
+                          <p:tn val="2"/>
+                        </p:cond>
                       </p:stCondLst>
                       <p:childTnLst>
                         <p:par>
@@ -7922,7 +9286,7 @@
                             </p:stCondLst>
                             <p:childTnLst>
                               <p:par>
-                                <p:cTn id="5" presetID="2" presetClass="entr" presetSubtype="4" fill="hold" nodeType="clickEffect">
+                                <p:cTn id="5" presetID="2" presetClass="entr" presetSubtype="4" fill="hold" nodeType="afterEffect">
                                   <p:stCondLst>
                                     <p:cond delay="250"/>
                                   </p:stCondLst>
@@ -8453,6 +9817,100 @@
                                           <p:spTgt spid="3">
                                             <p:txEl>
                                               <p:pRg st="5" end="5"/>
+                                            </p:txEl>
+                                          </p:spTgt>
+                                        </p:tgtEl>
+                                        <p:attrNameLst>
+                                          <p:attrName>ppt_y</p:attrName>
+                                        </p:attrNameLst>
+                                      </p:cBhvr>
+                                      <p:tavLst>
+                                        <p:tav tm="0">
+                                          <p:val>
+                                            <p:strVal val="1+#ppt_h/2"/>
+                                          </p:val>
+                                        </p:tav>
+                                        <p:tav tm="100000">
+                                          <p:val>
+                                            <p:strVal val="#ppt_y"/>
+                                          </p:val>
+                                        </p:tav>
+                                      </p:tavLst>
+                                    </p:anim>
+                                  </p:childTnLst>
+                                </p:cTn>
+                              </p:par>
+                            </p:childTnLst>
+                          </p:cTn>
+                        </p:par>
+                        <p:par>
+                          <p:cTn id="34" fill="hold">
+                            <p:stCondLst>
+                              <p:cond delay="6000"/>
+                            </p:stCondLst>
+                            <p:childTnLst>
+                              <p:par>
+                                <p:cTn id="35" presetID="2" presetClass="entr" presetSubtype="4" fill="hold" nodeType="afterEffect">
+                                  <p:stCondLst>
+                                    <p:cond delay="250"/>
+                                  </p:stCondLst>
+                                  <p:childTnLst>
+                                    <p:set>
+                                      <p:cBhvr>
+                                        <p:cTn id="36" dur="1" fill="hold">
+                                          <p:stCondLst>
+                                            <p:cond delay="0"/>
+                                          </p:stCondLst>
+                                        </p:cTn>
+                                        <p:tgtEl>
+                                          <p:spTgt spid="3">
+                                            <p:txEl>
+                                              <p:pRg st="6" end="6"/>
+                                            </p:txEl>
+                                          </p:spTgt>
+                                        </p:tgtEl>
+                                        <p:attrNameLst>
+                                          <p:attrName>style.visibility</p:attrName>
+                                        </p:attrNameLst>
+                                      </p:cBhvr>
+                                      <p:to>
+                                        <p:strVal val="visible"/>
+                                      </p:to>
+                                    </p:set>
+                                    <p:anim calcmode="lin" valueType="num">
+                                      <p:cBhvr additive="base">
+                                        <p:cTn id="37" dur="750" fill="hold"/>
+                                        <p:tgtEl>
+                                          <p:spTgt spid="3">
+                                            <p:txEl>
+                                              <p:pRg st="6" end="6"/>
+                                            </p:txEl>
+                                          </p:spTgt>
+                                        </p:tgtEl>
+                                        <p:attrNameLst>
+                                          <p:attrName>ppt_x</p:attrName>
+                                        </p:attrNameLst>
+                                      </p:cBhvr>
+                                      <p:tavLst>
+                                        <p:tav tm="0">
+                                          <p:val>
+                                            <p:strVal val="#ppt_x"/>
+                                          </p:val>
+                                        </p:tav>
+                                        <p:tav tm="100000">
+                                          <p:val>
+                                            <p:strVal val="#ppt_x"/>
+                                          </p:val>
+                                        </p:tav>
+                                      </p:tavLst>
+                                    </p:anim>
+                                    <p:anim calcmode="lin" valueType="num">
+                                      <p:cBhvr additive="base">
+                                        <p:cTn id="38" dur="750" fill="hold"/>
+                                        <p:tgtEl>
+                                          <p:spTgt spid="3">
+                                            <p:txEl>
+                                              <p:pRg st="6" end="6"/>
                                             </p:txEl>
                                           </p:spTgt>
                                         </p:tgtEl>
@@ -11237,6 +12695,9 @@
                     <p:cTn id="3" fill="hold">
                       <p:stCondLst>
                         <p:cond delay="indefinite"/>
+                        <p:cond evt="onBegin" delay="0">
+                          <p:tn val="2"/>
+                        </p:cond>
                       </p:stCondLst>
                       <p:childTnLst>
                         <p:par>
@@ -11246,7 +12707,7 @@
                             </p:stCondLst>
                             <p:childTnLst>
                               <p:par>
-                                <p:cTn id="5" presetID="10" presetClass="entr" presetSubtype="0" fill="hold" nodeType="clickEffect">
+                                <p:cTn id="5" presetID="10" presetClass="entr" presetSubtype="0" fill="hold" nodeType="afterEffect">
                                   <p:stCondLst>
                                     <p:cond delay="0"/>
                                   </p:stCondLst>
@@ -12184,6 +13645,9 @@
                     <p:cTn id="3" fill="hold">
                       <p:stCondLst>
                         <p:cond delay="indefinite"/>
+                        <p:cond evt="onBegin" delay="0">
+                          <p:tn val="2"/>
+                        </p:cond>
                       </p:stCondLst>
                       <p:childTnLst>
                         <p:par>
@@ -12193,9 +13657,9 @@
                             </p:stCondLst>
                             <p:childTnLst>
                               <p:par>
-                                <p:cTn id="5" presetID="16" presetClass="entr" presetSubtype="21" fill="hold" nodeType="clickEffect">
+                                <p:cTn id="5" presetID="16" presetClass="entr" presetSubtype="21" fill="hold" nodeType="afterEffect">
                                   <p:stCondLst>
-                                    <p:cond delay="0"/>
+                                    <p:cond delay="250"/>
                                   </p:stCondLst>
                                   <p:childTnLst>
                                     <p:set>

</xml_diff>